<commit_message>
Popup is added to one layer
</commit_message>
<xml_diff>
--- a/UtDataBase/documents/design/DesignDiagram.pptx
+++ b/UtDataBase/documents/design/DesignDiagram.pptx
@@ -8,11 +8,12 @@
     <p:sldId id="256" r:id="rId2"/>
     <p:sldId id="257" r:id="rId3"/>
     <p:sldId id="258" r:id="rId4"/>
-    <p:sldId id="267" r:id="rId5"/>
-    <p:sldId id="268" r:id="rId6"/>
-    <p:sldId id="269" r:id="rId7"/>
-    <p:sldId id="259" r:id="rId8"/>
-    <p:sldId id="270" r:id="rId9"/>
+    <p:sldId id="271" r:id="rId5"/>
+    <p:sldId id="267" r:id="rId6"/>
+    <p:sldId id="268" r:id="rId7"/>
+    <p:sldId id="269" r:id="rId8"/>
+    <p:sldId id="259" r:id="rId9"/>
+    <p:sldId id="270" r:id="rId10"/>
   </p:sldIdLst>
   <p:sldSz cx="12192000" cy="6858000"/>
   <p:notesSz cx="6858000" cy="9144000"/>
@@ -266,7 +267,7 @@
           <a:p>
             <a:fld id="{C77DE98D-3F20-4390-89B5-C5CC5737EA0F}" type="datetimeFigureOut">
               <a:rPr lang="en-US" smtClean="0"/>
-              <a:t>4/15/2022</a:t>
+              <a:t>4/28/2022</a:t>
             </a:fld>
             <a:endParaRPr lang="en-US"/>
           </a:p>
@@ -464,7 +465,7 @@
           <a:p>
             <a:fld id="{C77DE98D-3F20-4390-89B5-C5CC5737EA0F}" type="datetimeFigureOut">
               <a:rPr lang="en-US" smtClean="0"/>
-              <a:t>4/15/2022</a:t>
+              <a:t>4/28/2022</a:t>
             </a:fld>
             <a:endParaRPr lang="en-US"/>
           </a:p>
@@ -672,7 +673,7 @@
           <a:p>
             <a:fld id="{C77DE98D-3F20-4390-89B5-C5CC5737EA0F}" type="datetimeFigureOut">
               <a:rPr lang="en-US" smtClean="0"/>
-              <a:t>4/15/2022</a:t>
+              <a:t>4/28/2022</a:t>
             </a:fld>
             <a:endParaRPr lang="en-US"/>
           </a:p>
@@ -870,7 +871,7 @@
           <a:p>
             <a:fld id="{C77DE98D-3F20-4390-89B5-C5CC5737EA0F}" type="datetimeFigureOut">
               <a:rPr lang="en-US" smtClean="0"/>
-              <a:t>4/15/2022</a:t>
+              <a:t>4/28/2022</a:t>
             </a:fld>
             <a:endParaRPr lang="en-US"/>
           </a:p>
@@ -1145,7 +1146,7 @@
           <a:p>
             <a:fld id="{C77DE98D-3F20-4390-89B5-C5CC5737EA0F}" type="datetimeFigureOut">
               <a:rPr lang="en-US" smtClean="0"/>
-              <a:t>4/15/2022</a:t>
+              <a:t>4/28/2022</a:t>
             </a:fld>
             <a:endParaRPr lang="en-US"/>
           </a:p>
@@ -1410,7 +1411,7 @@
           <a:p>
             <a:fld id="{C77DE98D-3F20-4390-89B5-C5CC5737EA0F}" type="datetimeFigureOut">
               <a:rPr lang="en-US" smtClean="0"/>
-              <a:t>4/15/2022</a:t>
+              <a:t>4/28/2022</a:t>
             </a:fld>
             <a:endParaRPr lang="en-US"/>
           </a:p>
@@ -1822,7 +1823,7 @@
           <a:p>
             <a:fld id="{C77DE98D-3F20-4390-89B5-C5CC5737EA0F}" type="datetimeFigureOut">
               <a:rPr lang="en-US" smtClean="0"/>
-              <a:t>4/15/2022</a:t>
+              <a:t>4/28/2022</a:t>
             </a:fld>
             <a:endParaRPr lang="en-US"/>
           </a:p>
@@ -1963,7 +1964,7 @@
           <a:p>
             <a:fld id="{C77DE98D-3F20-4390-89B5-C5CC5737EA0F}" type="datetimeFigureOut">
               <a:rPr lang="en-US" smtClean="0"/>
-              <a:t>4/15/2022</a:t>
+              <a:t>4/28/2022</a:t>
             </a:fld>
             <a:endParaRPr lang="en-US"/>
           </a:p>
@@ -2076,7 +2077,7 @@
           <a:p>
             <a:fld id="{C77DE98D-3F20-4390-89B5-C5CC5737EA0F}" type="datetimeFigureOut">
               <a:rPr lang="en-US" smtClean="0"/>
-              <a:t>4/15/2022</a:t>
+              <a:t>4/28/2022</a:t>
             </a:fld>
             <a:endParaRPr lang="en-US"/>
           </a:p>
@@ -2387,7 +2388,7 @@
           <a:p>
             <a:fld id="{C77DE98D-3F20-4390-89B5-C5CC5737EA0F}" type="datetimeFigureOut">
               <a:rPr lang="en-US" smtClean="0"/>
-              <a:t>4/15/2022</a:t>
+              <a:t>4/28/2022</a:t>
             </a:fld>
             <a:endParaRPr lang="en-US"/>
           </a:p>
@@ -2675,7 +2676,7 @@
           <a:p>
             <a:fld id="{C77DE98D-3F20-4390-89B5-C5CC5737EA0F}" type="datetimeFigureOut">
               <a:rPr lang="en-US" smtClean="0"/>
-              <a:t>4/15/2022</a:t>
+              <a:t>4/28/2022</a:t>
             </a:fld>
             <a:endParaRPr lang="en-US"/>
           </a:p>
@@ -2916,7 +2917,7 @@
           <a:p>
             <a:fld id="{C77DE98D-3F20-4390-89B5-C5CC5737EA0F}" type="datetimeFigureOut">
               <a:rPr lang="en-US" smtClean="0"/>
-              <a:t>4/15/2022</a:t>
+              <a:t>4/28/2022</a:t>
             </a:fld>
             <a:endParaRPr lang="en-US"/>
           </a:p>
@@ -6733,6 +6734,902 @@
           <a:chExt cx="0" cy="0"/>
         </a:xfrm>
       </p:grpSpPr>
+      <p:sp>
+        <p:nvSpPr>
+          <p:cNvPr id="11" name="TextBox 10">
+            <a:extLst>
+              <a:ext uri="{FF2B5EF4-FFF2-40B4-BE49-F238E27FC236}">
+                <a16:creationId xmlns:a16="http://schemas.microsoft.com/office/drawing/2014/main" id="{A1E62C23-73FD-46C3-B56D-8D765A89D3F0}"/>
+              </a:ext>
+            </a:extLst>
+          </p:cNvPr>
+          <p:cNvSpPr txBox="1"/>
+          <p:nvPr/>
+        </p:nvSpPr>
+        <p:spPr>
+          <a:xfrm>
+            <a:off x="3696310" y="1776221"/>
+            <a:ext cx="697370" cy="369332"/>
+          </a:xfrm>
+          <a:prstGeom prst="rect">
+            <a:avLst/>
+          </a:prstGeom>
+          <a:noFill/>
+          <a:ln>
+            <a:solidFill>
+              <a:schemeClr val="tx1"/>
+            </a:solidFill>
+          </a:ln>
+        </p:spPr>
+        <p:txBody>
+          <a:bodyPr wrap="none" rtlCol="0">
+            <a:spAutoFit/>
+          </a:bodyPr>
+          <a:lstStyle/>
+          <a:p>
+            <a:r>
+              <a:rPr lang="en-US" dirty="0"/>
+              <a:t>Index</a:t>
+            </a:r>
+          </a:p>
+        </p:txBody>
+      </p:sp>
+      <p:sp>
+        <p:nvSpPr>
+          <p:cNvPr id="19" name="TextBox 18">
+            <a:extLst>
+              <a:ext uri="{FF2B5EF4-FFF2-40B4-BE49-F238E27FC236}">
+                <a16:creationId xmlns:a16="http://schemas.microsoft.com/office/drawing/2014/main" id="{8856C3E3-8C05-47DB-978F-7BC40AE2BCCD}"/>
+              </a:ext>
+            </a:extLst>
+          </p:cNvPr>
+          <p:cNvSpPr txBox="1"/>
+          <p:nvPr/>
+        </p:nvSpPr>
+        <p:spPr>
+          <a:xfrm>
+            <a:off x="3764310" y="2702858"/>
+            <a:ext cx="561372" cy="369332"/>
+          </a:xfrm>
+          <a:prstGeom prst="rect">
+            <a:avLst/>
+          </a:prstGeom>
+          <a:noFill/>
+          <a:ln>
+            <a:solidFill>
+              <a:schemeClr val="tx1"/>
+            </a:solidFill>
+          </a:ln>
+        </p:spPr>
+        <p:txBody>
+          <a:bodyPr wrap="none" rtlCol="0">
+            <a:spAutoFit/>
+          </a:bodyPr>
+          <a:lstStyle/>
+          <a:p>
+            <a:r>
+              <a:rPr lang="en-US" dirty="0"/>
+              <a:t>App</a:t>
+            </a:r>
+          </a:p>
+        </p:txBody>
+      </p:sp>
+      <p:sp>
+        <p:nvSpPr>
+          <p:cNvPr id="22" name="TextBox 21">
+            <a:extLst>
+              <a:ext uri="{FF2B5EF4-FFF2-40B4-BE49-F238E27FC236}">
+                <a16:creationId xmlns:a16="http://schemas.microsoft.com/office/drawing/2014/main" id="{AEAF27DC-E201-40AD-88AF-A5206A7877C5}"/>
+              </a:ext>
+            </a:extLst>
+          </p:cNvPr>
+          <p:cNvSpPr txBox="1"/>
+          <p:nvPr/>
+        </p:nvSpPr>
+        <p:spPr>
+          <a:xfrm>
+            <a:off x="3523860" y="3624729"/>
+            <a:ext cx="1042273" cy="369332"/>
+          </a:xfrm>
+          <a:prstGeom prst="rect">
+            <a:avLst/>
+          </a:prstGeom>
+          <a:noFill/>
+          <a:ln>
+            <a:solidFill>
+              <a:schemeClr val="tx1"/>
+            </a:solidFill>
+          </a:ln>
+        </p:spPr>
+        <p:txBody>
+          <a:bodyPr wrap="none" rtlCol="0">
+            <a:spAutoFit/>
+          </a:bodyPr>
+          <a:lstStyle/>
+          <a:p>
+            <a:r>
+              <a:rPr lang="en-US" dirty="0" err="1"/>
+              <a:t>Basemap</a:t>
+            </a:r>
+            <a:endParaRPr lang="en-US" dirty="0"/>
+          </a:p>
+        </p:txBody>
+      </p:sp>
+      <p:cxnSp>
+        <p:nvCxnSpPr>
+          <p:cNvPr id="3" name="Straight Arrow Connector 2">
+            <a:extLst>
+              <a:ext uri="{FF2B5EF4-FFF2-40B4-BE49-F238E27FC236}">
+                <a16:creationId xmlns:a16="http://schemas.microsoft.com/office/drawing/2014/main" id="{A47522D6-8ED4-490C-9F46-184B279463CA}"/>
+              </a:ext>
+            </a:extLst>
+          </p:cNvPr>
+          <p:cNvCxnSpPr>
+            <a:cxnSpLocks/>
+            <a:stCxn id="19" idx="0"/>
+            <a:endCxn id="11" idx="2"/>
+          </p:cNvCxnSpPr>
+          <p:nvPr/>
+        </p:nvCxnSpPr>
+        <p:spPr>
+          <a:xfrm flipH="1" flipV="1">
+            <a:off x="4044995" y="2145553"/>
+            <a:ext cx="1" cy="557305"/>
+          </a:xfrm>
+          <a:prstGeom prst="straightConnector1">
+            <a:avLst/>
+          </a:prstGeom>
+          <a:ln>
+            <a:solidFill>
+              <a:schemeClr val="tx1"/>
+            </a:solidFill>
+            <a:tailEnd type="triangle"/>
+          </a:ln>
+        </p:spPr>
+        <p:style>
+          <a:lnRef idx="1">
+            <a:schemeClr val="accent1"/>
+          </a:lnRef>
+          <a:fillRef idx="0">
+            <a:schemeClr val="accent1"/>
+          </a:fillRef>
+          <a:effectRef idx="0">
+            <a:schemeClr val="accent1"/>
+          </a:effectRef>
+          <a:fontRef idx="minor">
+            <a:schemeClr val="tx1"/>
+          </a:fontRef>
+        </p:style>
+      </p:cxnSp>
+      <p:cxnSp>
+        <p:nvCxnSpPr>
+          <p:cNvPr id="30" name="Straight Arrow Connector 29">
+            <a:extLst>
+              <a:ext uri="{FF2B5EF4-FFF2-40B4-BE49-F238E27FC236}">
+                <a16:creationId xmlns:a16="http://schemas.microsoft.com/office/drawing/2014/main" id="{D6FA6D69-7F56-448E-BD95-E64D67B4B106}"/>
+              </a:ext>
+            </a:extLst>
+          </p:cNvPr>
+          <p:cNvCxnSpPr>
+            <a:cxnSpLocks/>
+            <a:stCxn id="22" idx="0"/>
+            <a:endCxn id="19" idx="2"/>
+          </p:cNvCxnSpPr>
+          <p:nvPr/>
+        </p:nvCxnSpPr>
+        <p:spPr>
+          <a:xfrm flipH="1" flipV="1">
+            <a:off x="4044996" y="3072190"/>
+            <a:ext cx="1" cy="552539"/>
+          </a:xfrm>
+          <a:prstGeom prst="straightConnector1">
+            <a:avLst/>
+          </a:prstGeom>
+          <a:ln>
+            <a:solidFill>
+              <a:schemeClr val="tx1"/>
+            </a:solidFill>
+            <a:tailEnd type="triangle"/>
+          </a:ln>
+        </p:spPr>
+        <p:style>
+          <a:lnRef idx="1">
+            <a:schemeClr val="accent1"/>
+          </a:lnRef>
+          <a:fillRef idx="0">
+            <a:schemeClr val="accent1"/>
+          </a:fillRef>
+          <a:effectRef idx="0">
+            <a:schemeClr val="accent1"/>
+          </a:effectRef>
+          <a:fontRef idx="minor">
+            <a:schemeClr val="tx1"/>
+          </a:fontRef>
+        </p:style>
+      </p:cxnSp>
+      <p:sp>
+        <p:nvSpPr>
+          <p:cNvPr id="31" name="TextBox 30">
+            <a:extLst>
+              <a:ext uri="{FF2B5EF4-FFF2-40B4-BE49-F238E27FC236}">
+                <a16:creationId xmlns:a16="http://schemas.microsoft.com/office/drawing/2014/main" id="{B4DC3A71-FDA5-41A5-844A-A963FE432E20}"/>
+              </a:ext>
+            </a:extLst>
+          </p:cNvPr>
+          <p:cNvSpPr txBox="1"/>
+          <p:nvPr/>
+        </p:nvSpPr>
+        <p:spPr>
+          <a:xfrm>
+            <a:off x="3574355" y="4919239"/>
+            <a:ext cx="941283" cy="369332"/>
+          </a:xfrm>
+          <a:prstGeom prst="rect">
+            <a:avLst/>
+          </a:prstGeom>
+          <a:noFill/>
+          <a:ln>
+            <a:solidFill>
+              <a:schemeClr val="tx1"/>
+            </a:solidFill>
+          </a:ln>
+        </p:spPr>
+        <p:txBody>
+          <a:bodyPr wrap="none" rtlCol="0">
+            <a:spAutoFit/>
+          </a:bodyPr>
+          <a:lstStyle/>
+          <a:p>
+            <a:r>
+              <a:rPr lang="en-US" dirty="0" err="1"/>
+              <a:t>useMap</a:t>
+            </a:r>
+            <a:endParaRPr lang="en-US" dirty="0"/>
+          </a:p>
+        </p:txBody>
+      </p:sp>
+      <p:sp>
+        <p:nvSpPr>
+          <p:cNvPr id="32" name="TextBox 31">
+            <a:extLst>
+              <a:ext uri="{FF2B5EF4-FFF2-40B4-BE49-F238E27FC236}">
+                <a16:creationId xmlns:a16="http://schemas.microsoft.com/office/drawing/2014/main" id="{12FC6A14-CD8D-4DC5-AAE6-4AAE2F3DB9F0}"/>
+              </a:ext>
+            </a:extLst>
+          </p:cNvPr>
+          <p:cNvSpPr txBox="1"/>
+          <p:nvPr/>
+        </p:nvSpPr>
+        <p:spPr>
+          <a:xfrm>
+            <a:off x="5503846" y="3208404"/>
+            <a:ext cx="1378775" cy="369332"/>
+          </a:xfrm>
+          <a:prstGeom prst="rect">
+            <a:avLst/>
+          </a:prstGeom>
+          <a:noFill/>
+          <a:ln>
+            <a:solidFill>
+              <a:schemeClr val="tx1"/>
+            </a:solidFill>
+          </a:ln>
+        </p:spPr>
+        <p:txBody>
+          <a:bodyPr wrap="none" rtlCol="0">
+            <a:spAutoFit/>
+          </a:bodyPr>
+          <a:lstStyle/>
+          <a:p>
+            <a:r>
+              <a:rPr lang="en-US" dirty="0" err="1"/>
+              <a:t>LayerControl</a:t>
+            </a:r>
+            <a:endParaRPr lang="en-US" dirty="0"/>
+          </a:p>
+        </p:txBody>
+      </p:sp>
+      <p:cxnSp>
+        <p:nvCxnSpPr>
+          <p:cNvPr id="33" name="Straight Arrow Connector 32">
+            <a:extLst>
+              <a:ext uri="{FF2B5EF4-FFF2-40B4-BE49-F238E27FC236}">
+                <a16:creationId xmlns:a16="http://schemas.microsoft.com/office/drawing/2014/main" id="{CE916C6E-826B-46A2-9A12-6CCCC0D4D8B4}"/>
+              </a:ext>
+            </a:extLst>
+          </p:cNvPr>
+          <p:cNvCxnSpPr>
+            <a:cxnSpLocks/>
+            <a:stCxn id="31" idx="0"/>
+            <a:endCxn id="22" idx="2"/>
+          </p:cNvCxnSpPr>
+          <p:nvPr/>
+        </p:nvCxnSpPr>
+        <p:spPr>
+          <a:xfrm flipV="1">
+            <a:off x="4044997" y="3994061"/>
+            <a:ext cx="0" cy="925178"/>
+          </a:xfrm>
+          <a:prstGeom prst="straightConnector1">
+            <a:avLst/>
+          </a:prstGeom>
+          <a:ln>
+            <a:solidFill>
+              <a:schemeClr val="tx1"/>
+            </a:solidFill>
+            <a:tailEnd type="triangle"/>
+          </a:ln>
+        </p:spPr>
+        <p:style>
+          <a:lnRef idx="1">
+            <a:schemeClr val="accent1"/>
+          </a:lnRef>
+          <a:fillRef idx="0">
+            <a:schemeClr val="accent1"/>
+          </a:fillRef>
+          <a:effectRef idx="0">
+            <a:schemeClr val="accent1"/>
+          </a:effectRef>
+          <a:fontRef idx="minor">
+            <a:schemeClr val="tx1"/>
+          </a:fontRef>
+        </p:style>
+      </p:cxnSp>
+      <p:cxnSp>
+        <p:nvCxnSpPr>
+          <p:cNvPr id="34" name="Straight Arrow Connector 33">
+            <a:extLst>
+              <a:ext uri="{FF2B5EF4-FFF2-40B4-BE49-F238E27FC236}">
+                <a16:creationId xmlns:a16="http://schemas.microsoft.com/office/drawing/2014/main" id="{3CB99330-5C0D-4931-B264-5AD0097B86BE}"/>
+              </a:ext>
+            </a:extLst>
+          </p:cNvPr>
+          <p:cNvCxnSpPr>
+            <a:cxnSpLocks/>
+            <a:stCxn id="32" idx="1"/>
+            <a:endCxn id="22" idx="3"/>
+          </p:cNvCxnSpPr>
+          <p:nvPr/>
+        </p:nvCxnSpPr>
+        <p:spPr>
+          <a:xfrm flipH="1">
+            <a:off x="4566133" y="3393070"/>
+            <a:ext cx="937713" cy="416325"/>
+          </a:xfrm>
+          <a:prstGeom prst="straightConnector1">
+            <a:avLst/>
+          </a:prstGeom>
+          <a:ln>
+            <a:solidFill>
+              <a:schemeClr val="tx1"/>
+            </a:solidFill>
+            <a:tailEnd type="triangle"/>
+          </a:ln>
+        </p:spPr>
+        <p:style>
+          <a:lnRef idx="1">
+            <a:schemeClr val="accent1"/>
+          </a:lnRef>
+          <a:fillRef idx="0">
+            <a:schemeClr val="accent1"/>
+          </a:fillRef>
+          <a:effectRef idx="0">
+            <a:schemeClr val="accent1"/>
+          </a:effectRef>
+          <a:fontRef idx="minor">
+            <a:schemeClr val="tx1"/>
+          </a:fontRef>
+        </p:style>
+      </p:cxnSp>
+      <p:sp>
+        <p:nvSpPr>
+          <p:cNvPr id="36" name="TextBox 35">
+            <a:extLst>
+              <a:ext uri="{FF2B5EF4-FFF2-40B4-BE49-F238E27FC236}">
+                <a16:creationId xmlns:a16="http://schemas.microsoft.com/office/drawing/2014/main" id="{3EB80BBE-F46C-4767-AA55-2572B2991ACE}"/>
+              </a:ext>
+            </a:extLst>
+          </p:cNvPr>
+          <p:cNvSpPr txBox="1"/>
+          <p:nvPr/>
+        </p:nvSpPr>
+        <p:spPr>
+          <a:xfrm>
+            <a:off x="5734286" y="4611594"/>
+            <a:ext cx="1288045" cy="369332"/>
+          </a:xfrm>
+          <a:prstGeom prst="rect">
+            <a:avLst/>
+          </a:prstGeom>
+          <a:noFill/>
+          <a:ln>
+            <a:solidFill>
+              <a:schemeClr val="tx1"/>
+            </a:solidFill>
+          </a:ln>
+        </p:spPr>
+        <p:txBody>
+          <a:bodyPr wrap="none" rtlCol="0">
+            <a:spAutoFit/>
+          </a:bodyPr>
+          <a:lstStyle/>
+          <a:p>
+            <a:r>
+              <a:rPr lang="en-US" dirty="0" err="1"/>
+              <a:t>MapService</a:t>
+            </a:r>
+            <a:endParaRPr lang="en-US" dirty="0"/>
+          </a:p>
+        </p:txBody>
+      </p:sp>
+      <p:sp>
+        <p:nvSpPr>
+          <p:cNvPr id="37" name="TextBox 36">
+            <a:extLst>
+              <a:ext uri="{FF2B5EF4-FFF2-40B4-BE49-F238E27FC236}">
+                <a16:creationId xmlns:a16="http://schemas.microsoft.com/office/drawing/2014/main" id="{1FA26FA5-5D92-4CE8-A340-7DE1D27725FB}"/>
+              </a:ext>
+            </a:extLst>
+          </p:cNvPr>
+          <p:cNvSpPr txBox="1"/>
+          <p:nvPr/>
+        </p:nvSpPr>
+        <p:spPr>
+          <a:xfrm>
+            <a:off x="5734285" y="5444245"/>
+            <a:ext cx="1250022" cy="369332"/>
+          </a:xfrm>
+          <a:prstGeom prst="rect">
+            <a:avLst/>
+          </a:prstGeom>
+          <a:noFill/>
+          <a:ln>
+            <a:solidFill>
+              <a:schemeClr val="tx1"/>
+            </a:solidFill>
+          </a:ln>
+        </p:spPr>
+        <p:txBody>
+          <a:bodyPr wrap="none" rtlCol="0">
+            <a:spAutoFit/>
+          </a:bodyPr>
+          <a:lstStyle/>
+          <a:p>
+            <a:r>
+              <a:rPr lang="en-US" dirty="0" err="1"/>
+              <a:t>SpatialData</a:t>
+            </a:r>
+            <a:endParaRPr lang="en-US" dirty="0"/>
+          </a:p>
+        </p:txBody>
+      </p:sp>
+      <p:cxnSp>
+        <p:nvCxnSpPr>
+          <p:cNvPr id="38" name="Straight Arrow Connector 37">
+            <a:extLst>
+              <a:ext uri="{FF2B5EF4-FFF2-40B4-BE49-F238E27FC236}">
+                <a16:creationId xmlns:a16="http://schemas.microsoft.com/office/drawing/2014/main" id="{14BEACFF-8E24-47D1-BBD0-AA52BD708A84}"/>
+              </a:ext>
+            </a:extLst>
+          </p:cNvPr>
+          <p:cNvCxnSpPr>
+            <a:cxnSpLocks/>
+            <a:stCxn id="36" idx="1"/>
+            <a:endCxn id="31" idx="3"/>
+          </p:cNvCxnSpPr>
+          <p:nvPr/>
+        </p:nvCxnSpPr>
+        <p:spPr>
+          <a:xfrm flipH="1">
+            <a:off x="4515638" y="4796260"/>
+            <a:ext cx="1218648" cy="307645"/>
+          </a:xfrm>
+          <a:prstGeom prst="straightConnector1">
+            <a:avLst/>
+          </a:prstGeom>
+          <a:ln>
+            <a:solidFill>
+              <a:schemeClr val="tx1"/>
+            </a:solidFill>
+            <a:tailEnd type="triangle"/>
+          </a:ln>
+        </p:spPr>
+        <p:style>
+          <a:lnRef idx="1">
+            <a:schemeClr val="accent1"/>
+          </a:lnRef>
+          <a:fillRef idx="0">
+            <a:schemeClr val="accent1"/>
+          </a:fillRef>
+          <a:effectRef idx="0">
+            <a:schemeClr val="accent1"/>
+          </a:effectRef>
+          <a:fontRef idx="minor">
+            <a:schemeClr val="tx1"/>
+          </a:fontRef>
+        </p:style>
+      </p:cxnSp>
+      <p:cxnSp>
+        <p:nvCxnSpPr>
+          <p:cNvPr id="40" name="Straight Arrow Connector 39">
+            <a:extLst>
+              <a:ext uri="{FF2B5EF4-FFF2-40B4-BE49-F238E27FC236}">
+                <a16:creationId xmlns:a16="http://schemas.microsoft.com/office/drawing/2014/main" id="{70211EAE-C033-473B-9615-95BE3DDA023D}"/>
+              </a:ext>
+            </a:extLst>
+          </p:cNvPr>
+          <p:cNvCxnSpPr>
+            <a:cxnSpLocks/>
+            <a:stCxn id="37" idx="1"/>
+            <a:endCxn id="31" idx="3"/>
+          </p:cNvCxnSpPr>
+          <p:nvPr/>
+        </p:nvCxnSpPr>
+        <p:spPr>
+          <a:xfrm flipH="1" flipV="1">
+            <a:off x="4515638" y="5103905"/>
+            <a:ext cx="1218647" cy="525006"/>
+          </a:xfrm>
+          <a:prstGeom prst="straightConnector1">
+            <a:avLst/>
+          </a:prstGeom>
+          <a:ln>
+            <a:solidFill>
+              <a:schemeClr val="tx1"/>
+            </a:solidFill>
+            <a:tailEnd type="triangle"/>
+          </a:ln>
+        </p:spPr>
+        <p:style>
+          <a:lnRef idx="1">
+            <a:schemeClr val="accent1"/>
+          </a:lnRef>
+          <a:fillRef idx="0">
+            <a:schemeClr val="accent1"/>
+          </a:fillRef>
+          <a:effectRef idx="0">
+            <a:schemeClr val="accent1"/>
+          </a:effectRef>
+          <a:fontRef idx="minor">
+            <a:schemeClr val="tx1"/>
+          </a:fontRef>
+        </p:style>
+      </p:cxnSp>
+      <p:cxnSp>
+        <p:nvCxnSpPr>
+          <p:cNvPr id="45" name="Straight Arrow Connector 44">
+            <a:extLst>
+              <a:ext uri="{FF2B5EF4-FFF2-40B4-BE49-F238E27FC236}">
+                <a16:creationId xmlns:a16="http://schemas.microsoft.com/office/drawing/2014/main" id="{AFCA3B7D-406F-4849-932B-B952AF57332D}"/>
+              </a:ext>
+            </a:extLst>
+          </p:cNvPr>
+          <p:cNvCxnSpPr>
+            <a:cxnSpLocks/>
+            <a:stCxn id="37" idx="0"/>
+            <a:endCxn id="36" idx="2"/>
+          </p:cNvCxnSpPr>
+          <p:nvPr/>
+        </p:nvCxnSpPr>
+        <p:spPr>
+          <a:xfrm flipV="1">
+            <a:off x="6359296" y="4980926"/>
+            <a:ext cx="19013" cy="463319"/>
+          </a:xfrm>
+          <a:prstGeom prst="straightConnector1">
+            <a:avLst/>
+          </a:prstGeom>
+          <a:ln>
+            <a:solidFill>
+              <a:schemeClr val="tx1"/>
+            </a:solidFill>
+            <a:tailEnd type="triangle"/>
+          </a:ln>
+        </p:spPr>
+        <p:style>
+          <a:lnRef idx="1">
+            <a:schemeClr val="accent1"/>
+          </a:lnRef>
+          <a:fillRef idx="0">
+            <a:schemeClr val="accent1"/>
+          </a:fillRef>
+          <a:effectRef idx="0">
+            <a:schemeClr val="accent1"/>
+          </a:effectRef>
+          <a:fontRef idx="minor">
+            <a:schemeClr val="tx1"/>
+          </a:fontRef>
+        </p:style>
+      </p:cxnSp>
+      <p:sp>
+        <p:nvSpPr>
+          <p:cNvPr id="48" name="TextBox 47">
+            <a:extLst>
+              <a:ext uri="{FF2B5EF4-FFF2-40B4-BE49-F238E27FC236}">
+                <a16:creationId xmlns:a16="http://schemas.microsoft.com/office/drawing/2014/main" id="{160834B2-E7D9-43C3-89B6-3B248BC84998}"/>
+              </a:ext>
+            </a:extLst>
+          </p:cNvPr>
+          <p:cNvSpPr txBox="1"/>
+          <p:nvPr/>
+        </p:nvSpPr>
+        <p:spPr>
+          <a:xfrm>
+            <a:off x="7754790" y="5444245"/>
+            <a:ext cx="1391599" cy="369332"/>
+          </a:xfrm>
+          <a:prstGeom prst="rect">
+            <a:avLst/>
+          </a:prstGeom>
+          <a:noFill/>
+          <a:ln>
+            <a:solidFill>
+              <a:schemeClr val="tx1"/>
+            </a:solidFill>
+          </a:ln>
+        </p:spPr>
+        <p:txBody>
+          <a:bodyPr wrap="none" rtlCol="0">
+            <a:spAutoFit/>
+          </a:bodyPr>
+          <a:lstStyle/>
+          <a:p>
+            <a:r>
+              <a:rPr lang="en-US" dirty="0" err="1"/>
+              <a:t>GeojsonData</a:t>
+            </a:r>
+            <a:endParaRPr lang="en-US" dirty="0"/>
+          </a:p>
+        </p:txBody>
+      </p:sp>
+      <p:cxnSp>
+        <p:nvCxnSpPr>
+          <p:cNvPr id="49" name="Straight Arrow Connector 48">
+            <a:extLst>
+              <a:ext uri="{FF2B5EF4-FFF2-40B4-BE49-F238E27FC236}">
+                <a16:creationId xmlns:a16="http://schemas.microsoft.com/office/drawing/2014/main" id="{DAA67419-E84D-44F2-BD39-C7E3B5A9AE26}"/>
+              </a:ext>
+            </a:extLst>
+          </p:cNvPr>
+          <p:cNvCxnSpPr>
+            <a:cxnSpLocks/>
+            <a:stCxn id="48" idx="1"/>
+            <a:endCxn id="37" idx="3"/>
+          </p:cNvCxnSpPr>
+          <p:nvPr/>
+        </p:nvCxnSpPr>
+        <p:spPr>
+          <a:xfrm flipH="1">
+            <a:off x="6984307" y="5628911"/>
+            <a:ext cx="770483" cy="0"/>
+          </a:xfrm>
+          <a:prstGeom prst="straightConnector1">
+            <a:avLst/>
+          </a:prstGeom>
+          <a:ln>
+            <a:solidFill>
+              <a:schemeClr val="tx1"/>
+            </a:solidFill>
+            <a:tailEnd type="triangle"/>
+          </a:ln>
+        </p:spPr>
+        <p:style>
+          <a:lnRef idx="1">
+            <a:schemeClr val="accent1"/>
+          </a:lnRef>
+          <a:fillRef idx="0">
+            <a:schemeClr val="accent1"/>
+          </a:fillRef>
+          <a:effectRef idx="0">
+            <a:schemeClr val="accent1"/>
+          </a:effectRef>
+          <a:fontRef idx="minor">
+            <a:schemeClr val="tx1"/>
+          </a:fontRef>
+        </p:style>
+      </p:cxnSp>
+      <p:sp>
+        <p:nvSpPr>
+          <p:cNvPr id="52" name="TextBox 51">
+            <a:extLst>
+              <a:ext uri="{FF2B5EF4-FFF2-40B4-BE49-F238E27FC236}">
+                <a16:creationId xmlns:a16="http://schemas.microsoft.com/office/drawing/2014/main" id="{33BF8178-3BAC-451E-B049-B1F7BAC90C4D}"/>
+              </a:ext>
+            </a:extLst>
+          </p:cNvPr>
+          <p:cNvSpPr txBox="1"/>
+          <p:nvPr/>
+        </p:nvSpPr>
+        <p:spPr>
+          <a:xfrm>
+            <a:off x="5802484" y="2404711"/>
+            <a:ext cx="810863" cy="369332"/>
+          </a:xfrm>
+          <a:prstGeom prst="rect">
+            <a:avLst/>
+          </a:prstGeom>
+          <a:noFill/>
+          <a:ln>
+            <a:solidFill>
+              <a:schemeClr val="tx1"/>
+            </a:solidFill>
+          </a:ln>
+        </p:spPr>
+        <p:txBody>
+          <a:bodyPr wrap="none" rtlCol="0">
+            <a:spAutoFit/>
+          </a:bodyPr>
+          <a:lstStyle/>
+          <a:p>
+            <a:r>
+              <a:rPr lang="en-US" dirty="0"/>
+              <a:t>Layout</a:t>
+            </a:r>
+          </a:p>
+        </p:txBody>
+      </p:sp>
+      <p:cxnSp>
+        <p:nvCxnSpPr>
+          <p:cNvPr id="53" name="Straight Arrow Connector 52">
+            <a:extLst>
+              <a:ext uri="{FF2B5EF4-FFF2-40B4-BE49-F238E27FC236}">
+                <a16:creationId xmlns:a16="http://schemas.microsoft.com/office/drawing/2014/main" id="{74324124-A8D2-4BA4-9C10-D0E459B15C66}"/>
+              </a:ext>
+            </a:extLst>
+          </p:cNvPr>
+          <p:cNvCxnSpPr>
+            <a:cxnSpLocks/>
+            <a:stCxn id="52" idx="1"/>
+            <a:endCxn id="19" idx="3"/>
+          </p:cNvCxnSpPr>
+          <p:nvPr/>
+        </p:nvCxnSpPr>
+        <p:spPr>
+          <a:xfrm flipH="1">
+            <a:off x="4325682" y="2589377"/>
+            <a:ext cx="1476802" cy="298147"/>
+          </a:xfrm>
+          <a:prstGeom prst="straightConnector1">
+            <a:avLst/>
+          </a:prstGeom>
+          <a:ln>
+            <a:solidFill>
+              <a:schemeClr val="tx1"/>
+            </a:solidFill>
+            <a:tailEnd type="triangle"/>
+          </a:ln>
+        </p:spPr>
+        <p:style>
+          <a:lnRef idx="1">
+            <a:schemeClr val="accent1"/>
+          </a:lnRef>
+          <a:fillRef idx="0">
+            <a:schemeClr val="accent1"/>
+          </a:fillRef>
+          <a:effectRef idx="0">
+            <a:schemeClr val="accent1"/>
+          </a:effectRef>
+          <a:fontRef idx="minor">
+            <a:schemeClr val="tx1"/>
+          </a:fontRef>
+        </p:style>
+      </p:cxnSp>
+      <p:sp>
+        <p:nvSpPr>
+          <p:cNvPr id="67" name="TextBox 66">
+            <a:extLst>
+              <a:ext uri="{FF2B5EF4-FFF2-40B4-BE49-F238E27FC236}">
+                <a16:creationId xmlns:a16="http://schemas.microsoft.com/office/drawing/2014/main" id="{7735FF60-3FFD-4866-AEB1-2AE4F3B1A794}"/>
+              </a:ext>
+            </a:extLst>
+          </p:cNvPr>
+          <p:cNvSpPr txBox="1"/>
+          <p:nvPr/>
+        </p:nvSpPr>
+        <p:spPr>
+          <a:xfrm>
+            <a:off x="3293571" y="759634"/>
+            <a:ext cx="1502847" cy="369332"/>
+          </a:xfrm>
+          <a:prstGeom prst="rect">
+            <a:avLst/>
+          </a:prstGeom>
+          <a:noFill/>
+          <a:ln>
+            <a:solidFill>
+              <a:schemeClr val="tx1"/>
+            </a:solidFill>
+          </a:ln>
+        </p:spPr>
+        <p:txBody>
+          <a:bodyPr wrap="none" rtlCol="0">
+            <a:spAutoFit/>
+          </a:bodyPr>
+          <a:lstStyle/>
+          <a:p>
+            <a:r>
+              <a:rPr lang="en-US" dirty="0"/>
+              <a:t>User interface</a:t>
+            </a:r>
+          </a:p>
+        </p:txBody>
+      </p:sp>
+      <p:cxnSp>
+        <p:nvCxnSpPr>
+          <p:cNvPr id="68" name="Straight Arrow Connector 67">
+            <a:extLst>
+              <a:ext uri="{FF2B5EF4-FFF2-40B4-BE49-F238E27FC236}">
+                <a16:creationId xmlns:a16="http://schemas.microsoft.com/office/drawing/2014/main" id="{B6784127-0E24-40A1-A587-5C079F993FD5}"/>
+              </a:ext>
+            </a:extLst>
+          </p:cNvPr>
+          <p:cNvCxnSpPr>
+            <a:cxnSpLocks/>
+            <a:stCxn id="11" idx="0"/>
+            <a:endCxn id="67" idx="2"/>
+          </p:cNvCxnSpPr>
+          <p:nvPr/>
+        </p:nvCxnSpPr>
+        <p:spPr>
+          <a:xfrm flipV="1">
+            <a:off x="4044995" y="1128966"/>
+            <a:ext cx="0" cy="647255"/>
+          </a:xfrm>
+          <a:prstGeom prst="straightConnector1">
+            <a:avLst/>
+          </a:prstGeom>
+          <a:ln>
+            <a:solidFill>
+              <a:schemeClr val="tx1"/>
+            </a:solidFill>
+            <a:tailEnd type="triangle"/>
+          </a:ln>
+        </p:spPr>
+        <p:style>
+          <a:lnRef idx="1">
+            <a:schemeClr val="accent1"/>
+          </a:lnRef>
+          <a:fillRef idx="0">
+            <a:schemeClr val="accent1"/>
+          </a:fillRef>
+          <a:effectRef idx="0">
+            <a:schemeClr val="accent1"/>
+          </a:effectRef>
+          <a:fontRef idx="minor">
+            <a:schemeClr val="tx1"/>
+          </a:fontRef>
+        </p:style>
+      </p:cxnSp>
+    </p:spTree>
+    <p:extLst>
+      <p:ext uri="{BB962C8B-B14F-4D97-AF65-F5344CB8AC3E}">
+        <p14:creationId xmlns:p14="http://schemas.microsoft.com/office/powerpoint/2010/main" val="809608246"/>
+      </p:ext>
+    </p:extLst>
+  </p:cSld>
+  <p:clrMapOvr>
+    <a:masterClrMapping/>
+  </p:clrMapOvr>
+</p:sld>
+</file>
+
+<file path=ppt/slides/slide4.xml><?xml version="1.0" encoding="utf-8"?>
+<p:sld xmlns:a="http://schemas.openxmlformats.org/drawingml/2006/main" xmlns:r="http://schemas.openxmlformats.org/officeDocument/2006/relationships" xmlns:p="http://schemas.openxmlformats.org/presentationml/2006/main">
+  <p:cSld>
+    <p:spTree>
+      <p:nvGrpSpPr>
+        <p:cNvPr id="1" name=""/>
+        <p:cNvGrpSpPr/>
+        <p:nvPr/>
+      </p:nvGrpSpPr>
+      <p:grpSpPr>
+        <a:xfrm>
+          <a:off x="0" y="0"/>
+          <a:ext cx="0" cy="0"/>
+          <a:chOff x="0" y="0"/>
+          <a:chExt cx="0" cy="0"/>
+        </a:xfrm>
+      </p:grpSpPr>
       <p:graphicFrame>
         <p:nvGraphicFramePr>
           <p:cNvPr id="8" name="Table 8">
@@ -6745,13 +7642,7 @@
           <p:cNvGraphicFramePr>
             <a:graphicFrameLocks noGrp="1"/>
           </p:cNvGraphicFramePr>
-          <p:nvPr>
-            <p:extLst>
-              <p:ext uri="{D42A27DB-BD31-4B8C-83A1-F6EECF244321}">
-                <p14:modId xmlns:p14="http://schemas.microsoft.com/office/powerpoint/2010/main" val="207520816"/>
-              </p:ext>
-            </p:extLst>
-          </p:nvPr>
+          <p:nvPr/>
         </p:nvGraphicFramePr>
         <p:xfrm>
           <a:off x="2032000" y="719665"/>
@@ -7336,13 +8227,7 @@
           <p:cNvGraphicFramePr>
             <a:graphicFrameLocks noGrp="1"/>
           </p:cNvGraphicFramePr>
-          <p:nvPr>
-            <p:extLst>
-              <p:ext uri="{D42A27DB-BD31-4B8C-83A1-F6EECF244321}">
-                <p14:modId xmlns:p14="http://schemas.microsoft.com/office/powerpoint/2010/main" val="1031319515"/>
-              </p:ext>
-            </p:extLst>
-          </p:nvPr>
+          <p:nvPr/>
         </p:nvGraphicFramePr>
         <p:xfrm>
           <a:off x="8136965" y="549336"/>
@@ -7662,13 +8547,7 @@
           <p:cNvGraphicFramePr>
             <a:graphicFrameLocks noGrp="1"/>
           </p:cNvGraphicFramePr>
-          <p:nvPr>
-            <p:extLst>
-              <p:ext uri="{D42A27DB-BD31-4B8C-83A1-F6EECF244321}">
-                <p14:modId xmlns:p14="http://schemas.microsoft.com/office/powerpoint/2010/main" val="1104634532"/>
-              </p:ext>
-            </p:extLst>
-          </p:nvPr>
+          <p:nvPr/>
         </p:nvGraphicFramePr>
         <p:xfrm>
           <a:off x="2157507" y="4968936"/>
@@ -7996,13 +8875,7 @@
           <p:cNvGraphicFramePr>
             <a:graphicFrameLocks noGrp="1"/>
           </p:cNvGraphicFramePr>
-          <p:nvPr>
-            <p:extLst>
-              <p:ext uri="{D42A27DB-BD31-4B8C-83A1-F6EECF244321}">
-                <p14:modId xmlns:p14="http://schemas.microsoft.com/office/powerpoint/2010/main" val="1601463227"/>
-              </p:ext>
-            </p:extLst>
-          </p:nvPr>
+          <p:nvPr/>
         </p:nvGraphicFramePr>
         <p:xfrm>
           <a:off x="8089154" y="3642159"/>
@@ -8740,7 +9613,7 @@
     </p:spTree>
     <p:extLst>
       <p:ext uri="{BB962C8B-B14F-4D97-AF65-F5344CB8AC3E}">
-        <p14:creationId xmlns:p14="http://schemas.microsoft.com/office/powerpoint/2010/main" val="809608246"/>
+        <p14:creationId xmlns:p14="http://schemas.microsoft.com/office/powerpoint/2010/main" val="621707331"/>
       </p:ext>
     </p:extLst>
   </p:cSld>
@@ -8750,7 +9623,7 @@
 </p:sld>
 </file>
 
-<file path=ppt/slides/slide4.xml><?xml version="1.0" encoding="utf-8"?>
+<file path=ppt/slides/slide5.xml><?xml version="1.0" encoding="utf-8"?>
 <p:sld xmlns:a="http://schemas.openxmlformats.org/drawingml/2006/main" xmlns:r="http://schemas.openxmlformats.org/officeDocument/2006/relationships" xmlns:p="http://schemas.openxmlformats.org/presentationml/2006/main">
   <p:cSld>
     <p:spTree>
@@ -10597,7 +11470,7 @@
 </p:sld>
 </file>
 
-<file path=ppt/slides/slide5.xml><?xml version="1.0" encoding="utf-8"?>
+<file path=ppt/slides/slide6.xml><?xml version="1.0" encoding="utf-8"?>
 <p:sld xmlns:a="http://schemas.openxmlformats.org/drawingml/2006/main" xmlns:r="http://schemas.openxmlformats.org/officeDocument/2006/relationships" xmlns:p="http://schemas.openxmlformats.org/presentationml/2006/main">
   <p:cSld>
     <p:spTree>
@@ -12345,7 +13218,7 @@
 </p:sld>
 </file>
 
-<file path=ppt/slides/slide6.xml><?xml version="1.0" encoding="utf-8"?>
+<file path=ppt/slides/slide7.xml><?xml version="1.0" encoding="utf-8"?>
 <p:sld xmlns:a="http://schemas.openxmlformats.org/drawingml/2006/main" xmlns:r="http://schemas.openxmlformats.org/officeDocument/2006/relationships" xmlns:p="http://schemas.openxmlformats.org/presentationml/2006/main">
   <p:cSld>
     <p:spTree>
@@ -13571,7 +14444,7 @@
 </p:sld>
 </file>
 
-<file path=ppt/slides/slide7.xml><?xml version="1.0" encoding="utf-8"?>
+<file path=ppt/slides/slide8.xml><?xml version="1.0" encoding="utf-8"?>
 <p:sld xmlns:a="http://schemas.openxmlformats.org/drawingml/2006/main" xmlns:r="http://schemas.openxmlformats.org/officeDocument/2006/relationships" xmlns:p="http://schemas.openxmlformats.org/presentationml/2006/main">
   <p:cSld>
     <p:spTree>
@@ -14433,7 +15306,7 @@
 </p:sld>
 </file>
 
-<file path=ppt/slides/slide8.xml><?xml version="1.0" encoding="utf-8"?>
+<file path=ppt/slides/slide9.xml><?xml version="1.0" encoding="utf-8"?>
 <p:sld xmlns:a="http://schemas.openxmlformats.org/drawingml/2006/main" xmlns:r="http://schemas.openxmlformats.org/officeDocument/2006/relationships" xmlns:p="http://schemas.openxmlformats.org/presentationml/2006/main">
   <p:cSld>
     <p:spTree>

</xml_diff>